<commit_message>
misc changes, not sure
</commit_message>
<xml_diff>
--- a/writeup/journal_paper/figs/fendle_screenshot_fig.pptx
+++ b/writeup/journal_paper/figs/fendle_screenshot_fig.pptx
@@ -6,6 +6,8 @@
   </p:sldMasterIdLst>
   <p:sldIdLst>
     <p:sldId id="256" r:id="rId2"/>
+    <p:sldId id="258" r:id="rId3"/>
+    <p:sldId id="257" r:id="rId4"/>
   </p:sldIdLst>
   <p:sldSz cx="12192000" cy="6858000"/>
   <p:notesSz cx="6858000" cy="9144000"/>
@@ -104,6 +106,11 @@
       </a:defRPr>
     </a:lvl9pPr>
   </p:defaultTextStyle>
+  <p:extLst>
+    <p:ext uri="{EFAFB233-063F-42B5-8137-9DF3F51BA10A}">
+      <p15:sldGuideLst xmlns:p15="http://schemas.microsoft.com/office/powerpoint/2012/main"/>
+    </p:ext>
+  </p:extLst>
 </p:presentation>
 </file>
 
@@ -238,7 +245,7 @@
           <a:p>
             <a:fld id="{1F318BA2-426C-1B4B-9C7C-A8616AE5B84F}" type="datetimeFigureOut">
               <a:rPr lang="en-US" smtClean="0"/>
-              <a:t>4/9/18</a:t>
+              <a:t>5/29/18</a:t>
             </a:fld>
             <a:endParaRPr lang="en-US"/>
           </a:p>
@@ -408,7 +415,7 @@
           <a:p>
             <a:fld id="{1F318BA2-426C-1B4B-9C7C-A8616AE5B84F}" type="datetimeFigureOut">
               <a:rPr lang="en-US" smtClean="0"/>
-              <a:t>4/9/18</a:t>
+              <a:t>5/29/18</a:t>
             </a:fld>
             <a:endParaRPr lang="en-US"/>
           </a:p>
@@ -588,7 +595,7 @@
           <a:p>
             <a:fld id="{1F318BA2-426C-1B4B-9C7C-A8616AE5B84F}" type="datetimeFigureOut">
               <a:rPr lang="en-US" smtClean="0"/>
-              <a:t>4/9/18</a:t>
+              <a:t>5/29/18</a:t>
             </a:fld>
             <a:endParaRPr lang="en-US"/>
           </a:p>
@@ -758,7 +765,7 @@
           <a:p>
             <a:fld id="{1F318BA2-426C-1B4B-9C7C-A8616AE5B84F}" type="datetimeFigureOut">
               <a:rPr lang="en-US" smtClean="0"/>
-              <a:t>4/9/18</a:t>
+              <a:t>5/29/18</a:t>
             </a:fld>
             <a:endParaRPr lang="en-US"/>
           </a:p>
@@ -1004,7 +1011,7 @@
           <a:p>
             <a:fld id="{1F318BA2-426C-1B4B-9C7C-A8616AE5B84F}" type="datetimeFigureOut">
               <a:rPr lang="en-US" smtClean="0"/>
-              <a:t>4/9/18</a:t>
+              <a:t>5/29/18</a:t>
             </a:fld>
             <a:endParaRPr lang="en-US"/>
           </a:p>
@@ -1236,7 +1243,7 @@
           <a:p>
             <a:fld id="{1F318BA2-426C-1B4B-9C7C-A8616AE5B84F}" type="datetimeFigureOut">
               <a:rPr lang="en-US" smtClean="0"/>
-              <a:t>4/9/18</a:t>
+              <a:t>5/29/18</a:t>
             </a:fld>
             <a:endParaRPr lang="en-US"/>
           </a:p>
@@ -1603,7 +1610,7 @@
           <a:p>
             <a:fld id="{1F318BA2-426C-1B4B-9C7C-A8616AE5B84F}" type="datetimeFigureOut">
               <a:rPr lang="en-US" smtClean="0"/>
-              <a:t>4/9/18</a:t>
+              <a:t>5/29/18</a:t>
             </a:fld>
             <a:endParaRPr lang="en-US"/>
           </a:p>
@@ -1721,7 +1728,7 @@
           <a:p>
             <a:fld id="{1F318BA2-426C-1B4B-9C7C-A8616AE5B84F}" type="datetimeFigureOut">
               <a:rPr lang="en-US" smtClean="0"/>
-              <a:t>4/9/18</a:t>
+              <a:t>5/29/18</a:t>
             </a:fld>
             <a:endParaRPr lang="en-US"/>
           </a:p>
@@ -1816,7 +1823,7 @@
           <a:p>
             <a:fld id="{1F318BA2-426C-1B4B-9C7C-A8616AE5B84F}" type="datetimeFigureOut">
               <a:rPr lang="en-US" smtClean="0"/>
-              <a:t>4/9/18</a:t>
+              <a:t>5/29/18</a:t>
             </a:fld>
             <a:endParaRPr lang="en-US"/>
           </a:p>
@@ -2093,7 +2100,7 @@
           <a:p>
             <a:fld id="{1F318BA2-426C-1B4B-9C7C-A8616AE5B84F}" type="datetimeFigureOut">
               <a:rPr lang="en-US" smtClean="0"/>
-              <a:t>4/9/18</a:t>
+              <a:t>5/29/18</a:t>
             </a:fld>
             <a:endParaRPr lang="en-US"/>
           </a:p>
@@ -2346,7 +2353,7 @@
           <a:p>
             <a:fld id="{1F318BA2-426C-1B4B-9C7C-A8616AE5B84F}" type="datetimeFigureOut">
               <a:rPr lang="en-US" smtClean="0"/>
-              <a:t>4/9/18</a:t>
+              <a:t>5/29/18</a:t>
             </a:fld>
             <a:endParaRPr lang="en-US"/>
           </a:p>
@@ -2559,7 +2566,7 @@
           <a:p>
             <a:fld id="{1F318BA2-426C-1B4B-9C7C-A8616AE5B84F}" type="datetimeFigureOut">
               <a:rPr lang="en-US" smtClean="0"/>
-              <a:t>4/9/18</a:t>
+              <a:t>5/29/18</a:t>
             </a:fld>
             <a:endParaRPr lang="en-US"/>
           </a:p>
@@ -2964,48 +2971,715 @@
           <a:chExt cx="0" cy="0"/>
         </a:xfrm>
       </p:grpSpPr>
-      <p:sp>
-        <p:nvSpPr>
-          <p:cNvPr id="2" name="Title 1"/>
-          <p:cNvSpPr>
-            <a:spLocks noGrp="1"/>
-          </p:cNvSpPr>
-          <p:nvPr>
-            <p:ph type="ctrTitle"/>
-          </p:nvPr>
-        </p:nvSpPr>
-        <p:spPr/>
-        <p:txBody>
-          <a:bodyPr/>
-          <a:lstStyle/>
-          <a:p>
-            <a:endParaRPr lang="en-US"/>
-          </a:p>
-        </p:txBody>
-      </p:sp>
-      <p:sp>
-        <p:nvSpPr>
-          <p:cNvPr id="3" name="Subtitle 2"/>
-          <p:cNvSpPr>
-            <a:spLocks noGrp="1"/>
-          </p:cNvSpPr>
-          <p:nvPr>
-            <p:ph type="subTitle" idx="1"/>
-          </p:nvPr>
-        </p:nvSpPr>
-        <p:spPr/>
-        <p:txBody>
-          <a:bodyPr/>
-          <a:lstStyle/>
-          <a:p>
-            <a:endParaRPr lang="en-US"/>
-          </a:p>
-        </p:txBody>
-      </p:sp>
+      <p:pic>
+        <p:nvPicPr>
+          <p:cNvPr id="13" name="Picture 12"/>
+          <p:cNvPicPr>
+            <a:picLocks noChangeAspect="1"/>
+          </p:cNvPicPr>
+          <p:nvPr/>
+        </p:nvPicPr>
+        <p:blipFill rotWithShape="1">
+          <a:blip r:embed="rId2"/>
+          <a:srcRect t="52064" r="67211" b="10582"/>
+          <a:stretch/>
+        </p:blipFill>
+        <p:spPr>
+          <a:xfrm>
+            <a:off x="1427029" y="3653971"/>
+            <a:ext cx="3021240" cy="2561771"/>
+          </a:xfrm>
+          <a:prstGeom prst="rect">
+            <a:avLst/>
+          </a:prstGeom>
+        </p:spPr>
+      </p:pic>
+      <p:pic>
+        <p:nvPicPr>
+          <p:cNvPr id="14" name="Picture 13"/>
+          <p:cNvPicPr>
+            <a:picLocks noChangeAspect="1"/>
+          </p:cNvPicPr>
+          <p:nvPr/>
+        </p:nvPicPr>
+        <p:blipFill rotWithShape="1">
+          <a:blip r:embed="rId2"/>
+          <a:srcRect l="33896" t="52805" r="32553" b="10583"/>
+          <a:stretch/>
+        </p:blipFill>
+        <p:spPr>
+          <a:xfrm>
+            <a:off x="4903466" y="3679371"/>
+            <a:ext cx="3091542" cy="2510972"/>
+          </a:xfrm>
+          <a:prstGeom prst="rect">
+            <a:avLst/>
+          </a:prstGeom>
+        </p:spPr>
+      </p:pic>
+      <p:pic>
+        <p:nvPicPr>
+          <p:cNvPr id="15" name="Picture 14"/>
+          <p:cNvPicPr>
+            <a:picLocks noChangeAspect="1"/>
+          </p:cNvPicPr>
+          <p:nvPr/>
+        </p:nvPicPr>
+        <p:blipFill rotWithShape="1">
+          <a:blip r:embed="rId2"/>
+          <a:srcRect l="67211" t="53334" b="10582"/>
+          <a:stretch/>
+        </p:blipFill>
+        <p:spPr>
+          <a:xfrm>
+            <a:off x="8437266" y="3741056"/>
+            <a:ext cx="3021269" cy="2474686"/>
+          </a:xfrm>
+          <a:prstGeom prst="rect">
+            <a:avLst/>
+          </a:prstGeom>
+        </p:spPr>
+      </p:pic>
+      <p:sp>
+        <p:nvSpPr>
+          <p:cNvPr id="16" name="TextBox 15"/>
+          <p:cNvSpPr txBox="1"/>
+          <p:nvPr/>
+        </p:nvSpPr>
+        <p:spPr>
+          <a:xfrm>
+            <a:off x="1093483" y="3465231"/>
+            <a:ext cx="1747805" cy="461665"/>
+          </a:xfrm>
+          <a:prstGeom prst="rect">
+            <a:avLst/>
+          </a:prstGeom>
+          <a:noFill/>
+        </p:spPr>
+        <p:txBody>
+          <a:bodyPr wrap="square" rtlCol="0">
+            <a:spAutoFit/>
+          </a:bodyPr>
+          <a:lstStyle/>
+          <a:p>
+            <a:r>
+              <a:rPr lang="en-US" sz="2400" dirty="0" smtClean="0">
+                <a:latin typeface="Arial" charset="0"/>
+                <a:ea typeface="Arial" charset="0"/>
+                <a:cs typeface="Arial" charset="0"/>
+              </a:rPr>
+              <a:t>a</a:t>
+            </a:r>
+            <a:endParaRPr lang="en-US" dirty="0">
+              <a:latin typeface="Arial" charset="0"/>
+              <a:ea typeface="Arial" charset="0"/>
+              <a:cs typeface="Arial" charset="0"/>
+            </a:endParaRPr>
+          </a:p>
+        </p:txBody>
+      </p:sp>
+      <p:sp>
+        <p:nvSpPr>
+          <p:cNvPr id="17" name="TextBox 16"/>
+          <p:cNvSpPr txBox="1"/>
+          <p:nvPr/>
+        </p:nvSpPr>
+        <p:spPr>
+          <a:xfrm>
+            <a:off x="4574115" y="3448538"/>
+            <a:ext cx="1747805" cy="461665"/>
+          </a:xfrm>
+          <a:prstGeom prst="rect">
+            <a:avLst/>
+          </a:prstGeom>
+          <a:noFill/>
+        </p:spPr>
+        <p:txBody>
+          <a:bodyPr wrap="square" rtlCol="0">
+            <a:spAutoFit/>
+          </a:bodyPr>
+          <a:lstStyle/>
+          <a:p>
+            <a:r>
+              <a:rPr lang="en-US" sz="2400" dirty="0">
+                <a:latin typeface="Arial" charset="0"/>
+                <a:ea typeface="Arial" charset="0"/>
+                <a:cs typeface="Arial" charset="0"/>
+              </a:rPr>
+              <a:t>b</a:t>
+            </a:r>
+            <a:endParaRPr lang="en-US" dirty="0">
+              <a:latin typeface="Arial" charset="0"/>
+              <a:ea typeface="Arial" charset="0"/>
+              <a:cs typeface="Arial" charset="0"/>
+            </a:endParaRPr>
+          </a:p>
+        </p:txBody>
+      </p:sp>
+      <p:sp>
+        <p:nvSpPr>
+          <p:cNvPr id="18" name="TextBox 17"/>
+          <p:cNvSpPr txBox="1"/>
+          <p:nvPr/>
+        </p:nvSpPr>
+        <p:spPr>
+          <a:xfrm>
+            <a:off x="8112421" y="3448538"/>
+            <a:ext cx="236079" cy="461665"/>
+          </a:xfrm>
+          <a:prstGeom prst="rect">
+            <a:avLst/>
+          </a:prstGeom>
+          <a:noFill/>
+        </p:spPr>
+        <p:txBody>
+          <a:bodyPr wrap="square" rtlCol="0">
+            <a:spAutoFit/>
+          </a:bodyPr>
+          <a:lstStyle/>
+          <a:p>
+            <a:r>
+              <a:rPr lang="en-US" sz="2400" dirty="0" smtClean="0">
+                <a:latin typeface="Arial" charset="0"/>
+                <a:ea typeface="Arial" charset="0"/>
+                <a:cs typeface="Arial" charset="0"/>
+              </a:rPr>
+              <a:t>c</a:t>
+            </a:r>
+            <a:endParaRPr lang="en-US" dirty="0">
+              <a:latin typeface="Arial" charset="0"/>
+              <a:ea typeface="Arial" charset="0"/>
+              <a:cs typeface="Arial" charset="0"/>
+            </a:endParaRPr>
+          </a:p>
+        </p:txBody>
+      </p:sp>
+      <p:grpSp>
+        <p:nvGrpSpPr>
+          <p:cNvPr id="22" name="Group 21"/>
+          <p:cNvGrpSpPr/>
+          <p:nvPr/>
+        </p:nvGrpSpPr>
+        <p:grpSpPr>
+          <a:xfrm>
+            <a:off x="1093483" y="352643"/>
+            <a:ext cx="10515239" cy="2597777"/>
+            <a:chOff x="1093483" y="352643"/>
+            <a:chExt cx="10515239" cy="2597777"/>
+          </a:xfrm>
+        </p:grpSpPr>
+        <p:pic>
+          <p:nvPicPr>
+            <p:cNvPr id="4" name="Picture 3"/>
+            <p:cNvPicPr>
+              <a:picLocks noChangeAspect="1"/>
+            </p:cNvPicPr>
+            <p:nvPr/>
+          </p:nvPicPr>
+          <p:blipFill rotWithShape="1">
+            <a:blip r:embed="rId2"/>
+            <a:srcRect r="67212" b="66984"/>
+            <a:stretch/>
+          </p:blipFill>
+          <p:spPr>
+            <a:xfrm>
+              <a:off x="1427029" y="686192"/>
+              <a:ext cx="3021240" cy="2264228"/>
+            </a:xfrm>
+            <a:prstGeom prst="rect">
+              <a:avLst/>
+            </a:prstGeom>
+          </p:spPr>
+        </p:pic>
+        <p:pic>
+          <p:nvPicPr>
+            <p:cNvPr id="8" name="Picture 7"/>
+            <p:cNvPicPr>
+              <a:picLocks noChangeAspect="1"/>
+            </p:cNvPicPr>
+            <p:nvPr/>
+          </p:nvPicPr>
+          <p:blipFill rotWithShape="1">
+            <a:blip r:embed="rId2"/>
+            <a:srcRect l="32909" t="953" r="33696" b="66984"/>
+            <a:stretch/>
+          </p:blipFill>
+          <p:spPr>
+            <a:xfrm>
+              <a:off x="4903466" y="686192"/>
+              <a:ext cx="3168427" cy="2264228"/>
+            </a:xfrm>
+            <a:prstGeom prst="rect">
+              <a:avLst/>
+            </a:prstGeom>
+          </p:spPr>
+        </p:pic>
+        <p:pic>
+          <p:nvPicPr>
+            <p:cNvPr id="9" name="Picture 8"/>
+            <p:cNvPicPr>
+              <a:picLocks noChangeAspect="1"/>
+            </p:cNvPicPr>
+            <p:nvPr/>
+          </p:nvPicPr>
+          <p:blipFill rotWithShape="1">
+            <a:blip r:embed="rId2"/>
+            <a:srcRect l="65752" t="-1270" r="223" b="66984"/>
+            <a:stretch/>
+          </p:blipFill>
+          <p:spPr>
+            <a:xfrm>
+              <a:off x="8473636" y="599106"/>
+              <a:ext cx="3135086" cy="2351314"/>
+            </a:xfrm>
+            <a:prstGeom prst="rect">
+              <a:avLst/>
+            </a:prstGeom>
+          </p:spPr>
+        </p:pic>
+        <p:pic>
+          <p:nvPicPr>
+            <p:cNvPr id="12" name="Picture 11"/>
+            <p:cNvPicPr>
+              <a:picLocks noChangeAspect="1"/>
+            </p:cNvPicPr>
+            <p:nvPr/>
+          </p:nvPicPr>
+          <p:blipFill rotWithShape="1">
+            <a:blip r:embed="rId2"/>
+            <a:srcRect l="65752" t="-1270" r="223" b="66984"/>
+            <a:stretch/>
+          </p:blipFill>
+          <p:spPr>
+            <a:xfrm>
+              <a:off x="8437266" y="599106"/>
+              <a:ext cx="3135086" cy="2351314"/>
+            </a:xfrm>
+            <a:prstGeom prst="rect">
+              <a:avLst/>
+            </a:prstGeom>
+          </p:spPr>
+        </p:pic>
+        <p:sp>
+          <p:nvSpPr>
+            <p:cNvPr id="19" name="TextBox 18"/>
+            <p:cNvSpPr txBox="1"/>
+            <p:nvPr/>
+          </p:nvSpPr>
+          <p:spPr>
+            <a:xfrm>
+              <a:off x="1093483" y="369336"/>
+              <a:ext cx="1747805" cy="461665"/>
+            </a:xfrm>
+            <a:prstGeom prst="rect">
+              <a:avLst/>
+            </a:prstGeom>
+            <a:noFill/>
+          </p:spPr>
+          <p:txBody>
+            <a:bodyPr wrap="square" rtlCol="0">
+              <a:spAutoFit/>
+            </a:bodyPr>
+            <a:lstStyle/>
+            <a:p>
+              <a:r>
+                <a:rPr lang="en-US" sz="2400" dirty="0" smtClean="0">
+                  <a:latin typeface="Arial" charset="0"/>
+                  <a:ea typeface="Arial" charset="0"/>
+                  <a:cs typeface="Arial" charset="0"/>
+                </a:rPr>
+                <a:t>a</a:t>
+              </a:r>
+              <a:endParaRPr lang="en-US" dirty="0">
+                <a:latin typeface="Arial" charset="0"/>
+                <a:ea typeface="Arial" charset="0"/>
+                <a:cs typeface="Arial" charset="0"/>
+              </a:endParaRPr>
+            </a:p>
+          </p:txBody>
+        </p:sp>
+        <p:sp>
+          <p:nvSpPr>
+            <p:cNvPr id="20" name="TextBox 19"/>
+            <p:cNvSpPr txBox="1"/>
+            <p:nvPr/>
+          </p:nvSpPr>
+          <p:spPr>
+            <a:xfrm>
+              <a:off x="4574115" y="352643"/>
+              <a:ext cx="1747805" cy="461665"/>
+            </a:xfrm>
+            <a:prstGeom prst="rect">
+              <a:avLst/>
+            </a:prstGeom>
+            <a:noFill/>
+          </p:spPr>
+          <p:txBody>
+            <a:bodyPr wrap="square" rtlCol="0">
+              <a:spAutoFit/>
+            </a:bodyPr>
+            <a:lstStyle/>
+            <a:p>
+              <a:r>
+                <a:rPr lang="en-US" sz="2400" dirty="0">
+                  <a:latin typeface="Arial" charset="0"/>
+                  <a:ea typeface="Arial" charset="0"/>
+                  <a:cs typeface="Arial" charset="0"/>
+                </a:rPr>
+                <a:t>b</a:t>
+              </a:r>
+              <a:endParaRPr lang="en-US" dirty="0">
+                <a:latin typeface="Arial" charset="0"/>
+                <a:ea typeface="Arial" charset="0"/>
+                <a:cs typeface="Arial" charset="0"/>
+              </a:endParaRPr>
+            </a:p>
+          </p:txBody>
+        </p:sp>
+        <p:sp>
+          <p:nvSpPr>
+            <p:cNvPr id="21" name="TextBox 20"/>
+            <p:cNvSpPr txBox="1"/>
+            <p:nvPr/>
+          </p:nvSpPr>
+          <p:spPr>
+            <a:xfrm>
+              <a:off x="8112421" y="352643"/>
+              <a:ext cx="236079" cy="461665"/>
+            </a:xfrm>
+            <a:prstGeom prst="rect">
+              <a:avLst/>
+            </a:prstGeom>
+            <a:noFill/>
+          </p:spPr>
+          <p:txBody>
+            <a:bodyPr wrap="square" rtlCol="0">
+              <a:spAutoFit/>
+            </a:bodyPr>
+            <a:lstStyle/>
+            <a:p>
+              <a:r>
+                <a:rPr lang="en-US" sz="2400" dirty="0" smtClean="0">
+                  <a:latin typeface="Arial" charset="0"/>
+                  <a:ea typeface="Arial" charset="0"/>
+                  <a:cs typeface="Arial" charset="0"/>
+                </a:rPr>
+                <a:t>c</a:t>
+              </a:r>
+              <a:endParaRPr lang="en-US" dirty="0">
+                <a:latin typeface="Arial" charset="0"/>
+                <a:ea typeface="Arial" charset="0"/>
+                <a:cs typeface="Arial" charset="0"/>
+              </a:endParaRPr>
+            </a:p>
+          </p:txBody>
+        </p:sp>
+      </p:grpSp>
     </p:spTree>
     <p:extLst>
       <p:ext uri="{BB962C8B-B14F-4D97-AF65-F5344CB8AC3E}">
         <p14:creationId xmlns:p14="http://schemas.microsoft.com/office/powerpoint/2010/main" val="706619869"/>
+      </p:ext>
+    </p:extLst>
+  </p:cSld>
+  <p:clrMapOvr>
+    <a:masterClrMapping/>
+  </p:clrMapOvr>
+</p:sld>
+</file>
+
+<file path=ppt/slides/slide2.xml><?xml version="1.0" encoding="utf-8"?>
+<p:sld xmlns:a="http://schemas.openxmlformats.org/drawingml/2006/main" xmlns:r="http://schemas.openxmlformats.org/officeDocument/2006/relationships" xmlns:p="http://schemas.openxmlformats.org/presentationml/2006/main">
+  <p:cSld>
+    <p:spTree>
+      <p:nvGrpSpPr>
+        <p:cNvPr id="1" name=""/>
+        <p:cNvGrpSpPr/>
+        <p:nvPr/>
+      </p:nvGrpSpPr>
+      <p:grpSpPr>
+        <a:xfrm>
+          <a:off x="0" y="0"/>
+          <a:ext cx="0" cy="0"/>
+          <a:chOff x="0" y="0"/>
+          <a:chExt cx="0" cy="0"/>
+        </a:xfrm>
+      </p:grpSpPr>
+      <p:pic>
+        <p:nvPicPr>
+          <p:cNvPr id="4" name="Picture 3"/>
+          <p:cNvPicPr>
+            <a:picLocks noChangeAspect="1"/>
+          </p:cNvPicPr>
+          <p:nvPr/>
+        </p:nvPicPr>
+        <p:blipFill rotWithShape="1">
+          <a:blip r:embed="rId2"/>
+          <a:srcRect l="33896" t="52805" r="32553" b="10583"/>
+          <a:stretch/>
+        </p:blipFill>
+        <p:spPr>
+          <a:xfrm>
+            <a:off x="2668266" y="754741"/>
+            <a:ext cx="1492160" cy="1211943"/>
+          </a:xfrm>
+          <a:prstGeom prst="rect">
+            <a:avLst/>
+          </a:prstGeom>
+        </p:spPr>
+      </p:pic>
+      <p:pic>
+        <p:nvPicPr>
+          <p:cNvPr id="5" name="Picture 4"/>
+          <p:cNvPicPr>
+            <a:picLocks noChangeAspect="1"/>
+          </p:cNvPicPr>
+          <p:nvPr/>
+        </p:nvPicPr>
+        <p:blipFill rotWithShape="1">
+          <a:blip r:embed="rId2"/>
+          <a:srcRect l="67211" t="53334" b="10582"/>
+          <a:stretch/>
+        </p:blipFill>
+        <p:spPr>
+          <a:xfrm>
+            <a:off x="2668266" y="3476170"/>
+            <a:ext cx="1492160" cy="1222210"/>
+          </a:xfrm>
+          <a:prstGeom prst="rect">
+            <a:avLst/>
+          </a:prstGeom>
+        </p:spPr>
+      </p:pic>
+      <p:sp>
+        <p:nvSpPr>
+          <p:cNvPr id="6" name="TextBox 5"/>
+          <p:cNvSpPr txBox="1"/>
+          <p:nvPr/>
+        </p:nvSpPr>
+        <p:spPr>
+          <a:xfrm>
+            <a:off x="653143" y="991381"/>
+            <a:ext cx="1749197" cy="369332"/>
+          </a:xfrm>
+          <a:prstGeom prst="rect">
+            <a:avLst/>
+          </a:prstGeom>
+          <a:noFill/>
+        </p:spPr>
+        <p:txBody>
+          <a:bodyPr wrap="none" rtlCol="0">
+            <a:spAutoFit/>
+          </a:bodyPr>
+          <a:lstStyle/>
+          <a:p>
+            <a:r>
+              <a:rPr lang="en-US" dirty="0"/>
+              <a:t>Experimental-NF</a:t>
+            </a:r>
+          </a:p>
+        </p:txBody>
+      </p:sp>
+      <p:sp>
+        <p:nvSpPr>
+          <p:cNvPr id="7" name="TextBox 6"/>
+          <p:cNvSpPr txBox="1"/>
+          <p:nvPr/>
+        </p:nvSpPr>
+        <p:spPr>
+          <a:xfrm>
+            <a:off x="922362" y="385409"/>
+            <a:ext cx="1075294" cy="369332"/>
+          </a:xfrm>
+          <a:prstGeom prst="rect">
+            <a:avLst/>
+          </a:prstGeom>
+          <a:noFill/>
+        </p:spPr>
+        <p:txBody>
+          <a:bodyPr wrap="none" rtlCol="0">
+            <a:spAutoFit/>
+          </a:bodyPr>
+          <a:lstStyle/>
+          <a:p>
+            <a:r>
+              <a:rPr lang="en-US" smtClean="0"/>
+              <a:t>Trial Type</a:t>
+            </a:r>
+            <a:endParaRPr lang="en-US"/>
+          </a:p>
+        </p:txBody>
+      </p:sp>
+      <p:sp>
+        <p:nvSpPr>
+          <p:cNvPr id="8" name="TextBox 7"/>
+          <p:cNvSpPr txBox="1"/>
+          <p:nvPr/>
+        </p:nvSpPr>
+        <p:spPr>
+          <a:xfrm>
+            <a:off x="2876699" y="385409"/>
+            <a:ext cx="855362" cy="369332"/>
+          </a:xfrm>
+          <a:prstGeom prst="rect">
+            <a:avLst/>
+          </a:prstGeom>
+          <a:noFill/>
+        </p:spPr>
+        <p:txBody>
+          <a:bodyPr wrap="none" rtlCol="0">
+            <a:spAutoFit/>
+          </a:bodyPr>
+          <a:lstStyle/>
+          <a:p>
+            <a:r>
+              <a:rPr lang="en-US" smtClean="0"/>
+              <a:t>Display</a:t>
+            </a:r>
+            <a:endParaRPr lang="en-US"/>
+          </a:p>
+        </p:txBody>
+      </p:sp>
+      <p:sp>
+        <p:nvSpPr>
+          <p:cNvPr id="9" name="TextBox 8"/>
+          <p:cNvSpPr txBox="1"/>
+          <p:nvPr/>
+        </p:nvSpPr>
+        <p:spPr>
+          <a:xfrm>
+            <a:off x="4831036" y="385409"/>
+            <a:ext cx="736099" cy="369332"/>
+          </a:xfrm>
+          <a:prstGeom prst="rect">
+            <a:avLst/>
+          </a:prstGeom>
+          <a:noFill/>
+        </p:spPr>
+        <p:txBody>
+          <a:bodyPr wrap="none" rtlCol="0">
+            <a:spAutoFit/>
+          </a:bodyPr>
+          <a:lstStyle/>
+          <a:p>
+            <a:r>
+              <a:rPr lang="en-US" dirty="0" smtClean="0"/>
+              <a:t>Audio</a:t>
+            </a:r>
+            <a:endParaRPr lang="en-US" dirty="0"/>
+          </a:p>
+        </p:txBody>
+      </p:sp>
+      <p:sp>
+        <p:nvSpPr>
+          <p:cNvPr id="10" name="TextBox 9"/>
+          <p:cNvSpPr txBox="1"/>
+          <p:nvPr/>
+        </p:nvSpPr>
+        <p:spPr>
+          <a:xfrm>
+            <a:off x="653143" y="2450067"/>
+            <a:ext cx="1203215" cy="369332"/>
+          </a:xfrm>
+          <a:prstGeom prst="rect">
+            <a:avLst/>
+          </a:prstGeom>
+          <a:noFill/>
+        </p:spPr>
+        <p:txBody>
+          <a:bodyPr wrap="none" rtlCol="0">
+            <a:spAutoFit/>
+          </a:bodyPr>
+          <a:lstStyle/>
+          <a:p>
+            <a:r>
+              <a:rPr lang="en-US" smtClean="0"/>
+              <a:t>Control-NF</a:t>
+            </a:r>
+            <a:endParaRPr lang="en-US" dirty="0"/>
+          </a:p>
+        </p:txBody>
+      </p:sp>
+      <p:pic>
+        <p:nvPicPr>
+          <p:cNvPr id="11" name="Picture 10"/>
+          <p:cNvPicPr>
+            <a:picLocks noChangeAspect="1"/>
+          </p:cNvPicPr>
+          <p:nvPr/>
+        </p:nvPicPr>
+        <p:blipFill rotWithShape="1">
+          <a:blip r:embed="rId2"/>
+          <a:srcRect l="33896" t="52805" r="32553" b="10583"/>
+          <a:stretch/>
+        </p:blipFill>
+        <p:spPr>
+          <a:xfrm>
+            <a:off x="2668266" y="2061417"/>
+            <a:ext cx="1492160" cy="1211943"/>
+          </a:xfrm>
+          <a:prstGeom prst="rect">
+            <a:avLst/>
+          </a:prstGeom>
+        </p:spPr>
+      </p:pic>
+    </p:spTree>
+    <p:extLst>
+      <p:ext uri="{BB962C8B-B14F-4D97-AF65-F5344CB8AC3E}">
+        <p14:creationId xmlns:p14="http://schemas.microsoft.com/office/powerpoint/2010/main" val="1342772276"/>
+      </p:ext>
+    </p:extLst>
+  </p:cSld>
+  <p:clrMapOvr>
+    <a:masterClrMapping/>
+  </p:clrMapOvr>
+</p:sld>
+</file>
+
+<file path=ppt/slides/slide3.xml><?xml version="1.0" encoding="utf-8"?>
+<p:sld xmlns:a="http://schemas.openxmlformats.org/drawingml/2006/main" xmlns:r="http://schemas.openxmlformats.org/officeDocument/2006/relationships" xmlns:p="http://schemas.openxmlformats.org/presentationml/2006/main">
+  <p:cSld>
+    <p:spTree>
+      <p:nvGrpSpPr>
+        <p:cNvPr id="1" name=""/>
+        <p:cNvGrpSpPr/>
+        <p:nvPr/>
+      </p:nvGrpSpPr>
+      <p:grpSpPr>
+        <a:xfrm>
+          <a:off x="0" y="0"/>
+          <a:ext cx="0" cy="0"/>
+          <a:chOff x="0" y="0"/>
+          <a:chExt cx="0" cy="0"/>
+        </a:xfrm>
+      </p:grpSpPr>
+      <p:pic>
+        <p:nvPicPr>
+          <p:cNvPr id="4" name="Picture 3"/>
+          <p:cNvPicPr>
+            <a:picLocks noChangeAspect="1"/>
+          </p:cNvPicPr>
+          <p:nvPr/>
+        </p:nvPicPr>
+        <p:blipFill rotWithShape="1">
+          <a:blip r:embed="rId2"/>
+          <a:srcRect t="52064" b="10582"/>
+          <a:stretch/>
+        </p:blipFill>
+        <p:spPr>
+          <a:xfrm>
+            <a:off x="1314709" y="1451429"/>
+            <a:ext cx="9214240" cy="2561771"/>
+          </a:xfrm>
+          <a:prstGeom prst="rect">
+            <a:avLst/>
+          </a:prstGeom>
+        </p:spPr>
+      </p:pic>
+    </p:spTree>
+    <p:extLst>
+      <p:ext uri="{BB962C8B-B14F-4D97-AF65-F5344CB8AC3E}">
+        <p14:creationId xmlns:p14="http://schemas.microsoft.com/office/powerpoint/2010/main" val="1085513860"/>
       </p:ext>
     </p:extLst>
   </p:cSld>

</xml_diff>